<commit_message>
added new slides to powerpoint
</commit_message>
<xml_diff>
--- a/CPS 315 OOP Collaborative Programming Project 11.7.pptx
+++ b/CPS 315 OOP Collaborative Programming Project 11.7.pptx
@@ -13,6 +13,9 @@
     <p:sldId id="260" r:id="rId7"/>
     <p:sldId id="262" r:id="rId8"/>
     <p:sldId id="263" r:id="rId9"/>
+    <p:sldId id="264" r:id="rId10"/>
+    <p:sldId id="265" r:id="rId11"/>
+    <p:sldId id="266" r:id="rId12"/>
   </p:sldIdLst>
   <p:sldSz cx="12192000" cy="6858000"/>
   <p:notesSz cx="6858000" cy="9144000"/>
@@ -169,7 +172,7 @@
           <a:noFill/>
           <a:extLst>
             <a:ext uri="{909E8E84-426E-40dd-AFC4-6F175D3DCCD1}">
-              <a14:hiddenFill xmlns:a14="http://schemas.microsoft.com/office/drawing/2010/main" xmlns="">
+              <a14:hiddenFill xmlns="" xmlns:a14="http://schemas.microsoft.com/office/drawing/2010/main">
                 <a:solidFill>
                   <a:srgbClr val="FFFFFF"/>
                 </a:solidFill>
@@ -229,7 +232,7 @@
             </a:ln>
             <a:extLst>
               <a:ext uri="{91240B29-F687-4f45-9708-019B960494DF}">
-                <a14:hiddenLine xmlns:a14="http://schemas.microsoft.com/office/drawing/2010/main" xmlns="" w="9525">
+                <a14:hiddenLine xmlns="" xmlns:a14="http://schemas.microsoft.com/office/drawing/2010/main" w="9525">
                   <a:solidFill>
                     <a:srgbClr val="000000"/>
                   </a:solidFill>
@@ -319,7 +322,7 @@
             </a:ln>
             <a:extLst>
               <a:ext uri="{91240B29-F687-4f45-9708-019B960494DF}">
-                <a14:hiddenLine xmlns:a14="http://schemas.microsoft.com/office/drawing/2010/main" xmlns="" w="9525">
+                <a14:hiddenLine xmlns="" xmlns:a14="http://schemas.microsoft.com/office/drawing/2010/main" w="9525">
                   <a:solidFill>
                     <a:srgbClr val="000000"/>
                   </a:solidFill>
@@ -409,7 +412,7 @@
             </a:ln>
             <a:extLst>
               <a:ext uri="{91240B29-F687-4f45-9708-019B960494DF}">
-                <a14:hiddenLine xmlns:a14="http://schemas.microsoft.com/office/drawing/2010/main" xmlns="" w="9525">
+                <a14:hiddenLine xmlns="" xmlns:a14="http://schemas.microsoft.com/office/drawing/2010/main" w="9525">
                   <a:solidFill>
                     <a:srgbClr val="000000"/>
                   </a:solidFill>
@@ -443,7 +446,7 @@
             </a:ln>
             <a:extLst>
               <a:ext uri="{91240B29-F687-4f45-9708-019B960494DF}">
-                <a14:hiddenLine xmlns:a14="http://schemas.microsoft.com/office/drawing/2010/main" xmlns="" w="9525">
+                <a14:hiddenLine xmlns="" xmlns:a14="http://schemas.microsoft.com/office/drawing/2010/main" w="9525">
                   <a:solidFill>
                     <a:srgbClr val="000000"/>
                   </a:solidFill>
@@ -533,7 +536,7 @@
             </a:ln>
             <a:extLst>
               <a:ext uri="{91240B29-F687-4f45-9708-019B960494DF}">
-                <a14:hiddenLine xmlns:a14="http://schemas.microsoft.com/office/drawing/2010/main" xmlns="" w="9525">
+                <a14:hiddenLine xmlns="" xmlns:a14="http://schemas.microsoft.com/office/drawing/2010/main" w="9525">
                   <a:solidFill>
                     <a:srgbClr val="000000"/>
                   </a:solidFill>
@@ -595,7 +598,7 @@
             </a:ln>
             <a:extLst>
               <a:ext uri="{91240B29-F687-4f45-9708-019B960494DF}">
-                <a14:hiddenLine xmlns:a14="http://schemas.microsoft.com/office/drawing/2010/main" xmlns="" w="9525">
+                <a14:hiddenLine xmlns="" xmlns:a14="http://schemas.microsoft.com/office/drawing/2010/main" w="9525">
                   <a:solidFill>
                     <a:srgbClr val="000000"/>
                   </a:solidFill>
@@ -657,7 +660,7 @@
             </a:ln>
             <a:extLst>
               <a:ext uri="{91240B29-F687-4f45-9708-019B960494DF}">
-                <a14:hiddenLine xmlns:a14="http://schemas.microsoft.com/office/drawing/2010/main" xmlns="" w="9525">
+                <a14:hiddenLine xmlns="" xmlns:a14="http://schemas.microsoft.com/office/drawing/2010/main" w="9525">
                   <a:solidFill>
                     <a:srgbClr val="000000"/>
                   </a:solidFill>
@@ -747,7 +750,7 @@
             </a:ln>
             <a:extLst>
               <a:ext uri="{91240B29-F687-4f45-9708-019B960494DF}">
-                <a14:hiddenLine xmlns:a14="http://schemas.microsoft.com/office/drawing/2010/main" xmlns="" w="9525">
+                <a14:hiddenLine xmlns="" xmlns:a14="http://schemas.microsoft.com/office/drawing/2010/main" w="9525">
                   <a:solidFill>
                     <a:srgbClr val="000000"/>
                   </a:solidFill>
@@ -809,7 +812,7 @@
             </a:ln>
             <a:extLst>
               <a:ext uri="{91240B29-F687-4f45-9708-019B960494DF}">
-                <a14:hiddenLine xmlns:a14="http://schemas.microsoft.com/office/drawing/2010/main" xmlns="" w="9525">
+                <a14:hiddenLine xmlns="" xmlns:a14="http://schemas.microsoft.com/office/drawing/2010/main" w="9525">
                   <a:solidFill>
                     <a:srgbClr val="000000"/>
                   </a:solidFill>
@@ -871,7 +874,7 @@
             </a:ln>
             <a:extLst>
               <a:ext uri="{91240B29-F687-4f45-9708-019B960494DF}">
-                <a14:hiddenLine xmlns:a14="http://schemas.microsoft.com/office/drawing/2010/main" xmlns="" w="9525">
+                <a14:hiddenLine xmlns="" xmlns:a14="http://schemas.microsoft.com/office/drawing/2010/main" w="9525">
                   <a:solidFill>
                     <a:srgbClr val="000000"/>
                   </a:solidFill>
@@ -961,7 +964,7 @@
             </a:ln>
             <a:extLst>
               <a:ext uri="{91240B29-F687-4f45-9708-019B960494DF}">
-                <a14:hiddenLine xmlns:a14="http://schemas.microsoft.com/office/drawing/2010/main" xmlns="" w="9525">
+                <a14:hiddenLine xmlns="" xmlns:a14="http://schemas.microsoft.com/office/drawing/2010/main" w="9525">
                   <a:solidFill>
                     <a:srgbClr val="000000"/>
                   </a:solidFill>
@@ -1051,7 +1054,7 @@
             </a:ln>
             <a:extLst>
               <a:ext uri="{91240B29-F687-4f45-9708-019B960494DF}">
-                <a14:hiddenLine xmlns:a14="http://schemas.microsoft.com/office/drawing/2010/main" xmlns="" w="9525">
+                <a14:hiddenLine xmlns="" xmlns:a14="http://schemas.microsoft.com/office/drawing/2010/main" w="9525">
                   <a:solidFill>
                     <a:srgbClr val="000000"/>
                   </a:solidFill>
@@ -1113,7 +1116,7 @@
             </a:ln>
             <a:extLst>
               <a:ext uri="{91240B29-F687-4f45-9708-019B960494DF}">
-                <a14:hiddenLine xmlns:a14="http://schemas.microsoft.com/office/drawing/2010/main" xmlns="" w="9525">
+                <a14:hiddenLine xmlns="" xmlns:a14="http://schemas.microsoft.com/office/drawing/2010/main" w="9525">
                   <a:solidFill>
                     <a:srgbClr val="000000"/>
                   </a:solidFill>
@@ -1223,7 +1226,7 @@
             </a:ln>
             <a:extLst>
               <a:ext uri="{91240B29-F687-4f45-9708-019B960494DF}">
-                <a14:hiddenLine xmlns:a14="http://schemas.microsoft.com/office/drawing/2010/main" xmlns="" w="9525">
+                <a14:hiddenLine xmlns="" xmlns:a14="http://schemas.microsoft.com/office/drawing/2010/main" w="9525">
                   <a:solidFill>
                     <a:srgbClr val="000000"/>
                   </a:solidFill>
@@ -1285,7 +1288,7 @@
             </a:ln>
             <a:extLst>
               <a:ext uri="{91240B29-F687-4f45-9708-019B960494DF}">
-                <a14:hiddenLine xmlns:a14="http://schemas.microsoft.com/office/drawing/2010/main" xmlns="" w="9525">
+                <a14:hiddenLine xmlns="" xmlns:a14="http://schemas.microsoft.com/office/drawing/2010/main" w="9525">
                   <a:solidFill>
                     <a:srgbClr val="000000"/>
                   </a:solidFill>
@@ -1375,7 +1378,7 @@
             </a:ln>
             <a:extLst>
               <a:ext uri="{91240B29-F687-4f45-9708-019B960494DF}">
-                <a14:hiddenLine xmlns:a14="http://schemas.microsoft.com/office/drawing/2010/main" xmlns="" w="9525">
+                <a14:hiddenLine xmlns="" xmlns:a14="http://schemas.microsoft.com/office/drawing/2010/main" w="9525">
                   <a:solidFill>
                     <a:srgbClr val="000000"/>
                   </a:solidFill>
@@ -1465,7 +1468,7 @@
             </a:ln>
             <a:extLst>
               <a:ext uri="{91240B29-F687-4f45-9708-019B960494DF}">
-                <a14:hiddenLine xmlns:a14="http://schemas.microsoft.com/office/drawing/2010/main" xmlns="" w="9525">
+                <a14:hiddenLine xmlns="" xmlns:a14="http://schemas.microsoft.com/office/drawing/2010/main" w="9525">
                   <a:solidFill>
                     <a:srgbClr val="000000"/>
                   </a:solidFill>
@@ -1527,7 +1530,7 @@
             </a:ln>
             <a:extLst>
               <a:ext uri="{91240B29-F687-4f45-9708-019B960494DF}">
-                <a14:hiddenLine xmlns:a14="http://schemas.microsoft.com/office/drawing/2010/main" xmlns="" w="9525">
+                <a14:hiddenLine xmlns="" xmlns:a14="http://schemas.microsoft.com/office/drawing/2010/main" w="9525">
                   <a:solidFill>
                     <a:srgbClr val="000000"/>
                   </a:solidFill>
@@ -1617,7 +1620,7 @@
             </a:ln>
             <a:extLst>
               <a:ext uri="{91240B29-F687-4f45-9708-019B960494DF}">
-                <a14:hiddenLine xmlns:a14="http://schemas.microsoft.com/office/drawing/2010/main" xmlns="" w="9525">
+                <a14:hiddenLine xmlns="" xmlns:a14="http://schemas.microsoft.com/office/drawing/2010/main" w="9525">
                   <a:solidFill>
                     <a:srgbClr val="000000"/>
                   </a:solidFill>
@@ -1707,7 +1710,7 @@
             </a:ln>
             <a:extLst>
               <a:ext uri="{91240B29-F687-4f45-9708-019B960494DF}">
-                <a14:hiddenLine xmlns:a14="http://schemas.microsoft.com/office/drawing/2010/main" xmlns="" w="9525">
+                <a14:hiddenLine xmlns="" xmlns:a14="http://schemas.microsoft.com/office/drawing/2010/main" w="9525">
                   <a:solidFill>
                     <a:srgbClr val="000000"/>
                   </a:solidFill>
@@ -1763,7 +1766,7 @@
             </a:ln>
             <a:extLst>
               <a:ext uri="{91240B29-F687-4f45-9708-019B960494DF}">
-                <a14:hiddenLine xmlns:a14="http://schemas.microsoft.com/office/drawing/2010/main" xmlns="" w="9525">
+                <a14:hiddenLine xmlns="" xmlns:a14="http://schemas.microsoft.com/office/drawing/2010/main" w="9525">
                   <a:solidFill>
                     <a:srgbClr val="000000"/>
                   </a:solidFill>
@@ -1853,7 +1856,7 @@
             </a:ln>
             <a:extLst>
               <a:ext uri="{91240B29-F687-4f45-9708-019B960494DF}">
-                <a14:hiddenLine xmlns:a14="http://schemas.microsoft.com/office/drawing/2010/main" xmlns="" w="9525">
+                <a14:hiddenLine xmlns="" xmlns:a14="http://schemas.microsoft.com/office/drawing/2010/main" w="9525">
                   <a:solidFill>
                     <a:srgbClr val="000000"/>
                   </a:solidFill>
@@ -1909,7 +1912,7 @@
             </a:ln>
             <a:extLst>
               <a:ext uri="{91240B29-F687-4f45-9708-019B960494DF}">
-                <a14:hiddenLine xmlns:a14="http://schemas.microsoft.com/office/drawing/2010/main" xmlns="" w="9525">
+                <a14:hiddenLine xmlns="" xmlns:a14="http://schemas.microsoft.com/office/drawing/2010/main" w="9525">
                   <a:solidFill>
                     <a:srgbClr val="000000"/>
                   </a:solidFill>
@@ -1999,7 +2002,7 @@
             </a:ln>
             <a:extLst>
               <a:ext uri="{91240B29-F687-4f45-9708-019B960494DF}">
-                <a14:hiddenLine xmlns:a14="http://schemas.microsoft.com/office/drawing/2010/main" xmlns="" w="9525">
+                <a14:hiddenLine xmlns="" xmlns:a14="http://schemas.microsoft.com/office/drawing/2010/main" w="9525">
                   <a:solidFill>
                     <a:srgbClr val="000000"/>
                   </a:solidFill>
@@ -2067,7 +2070,7 @@
             </a:ln>
             <a:extLst>
               <a:ext uri="{91240B29-F687-4f45-9708-019B960494DF}">
-                <a14:hiddenLine xmlns:a14="http://schemas.microsoft.com/office/drawing/2010/main" xmlns="" w="9525">
+                <a14:hiddenLine xmlns="" xmlns:a14="http://schemas.microsoft.com/office/drawing/2010/main" w="9525">
                   <a:solidFill>
                     <a:srgbClr val="000000"/>
                   </a:solidFill>
@@ -2157,7 +2160,7 @@
             </a:ln>
             <a:extLst>
               <a:ext uri="{91240B29-F687-4f45-9708-019B960494DF}">
-                <a14:hiddenLine xmlns:a14="http://schemas.microsoft.com/office/drawing/2010/main" xmlns="" w="9525">
+                <a14:hiddenLine xmlns="" xmlns:a14="http://schemas.microsoft.com/office/drawing/2010/main" w="9525">
                   <a:solidFill>
                     <a:srgbClr val="000000"/>
                   </a:solidFill>
@@ -2225,7 +2228,7 @@
             </a:ln>
             <a:extLst>
               <a:ext uri="{91240B29-F687-4f45-9708-019B960494DF}">
-                <a14:hiddenLine xmlns:a14="http://schemas.microsoft.com/office/drawing/2010/main" xmlns="" w="9525">
+                <a14:hiddenLine xmlns="" xmlns:a14="http://schemas.microsoft.com/office/drawing/2010/main" w="9525">
                   <a:solidFill>
                     <a:srgbClr val="000000"/>
                   </a:solidFill>
@@ -2315,7 +2318,7 @@
             </a:ln>
             <a:extLst>
               <a:ext uri="{91240B29-F687-4f45-9708-019B960494DF}">
-                <a14:hiddenLine xmlns:a14="http://schemas.microsoft.com/office/drawing/2010/main" xmlns="" w="9525">
+                <a14:hiddenLine xmlns="" xmlns:a14="http://schemas.microsoft.com/office/drawing/2010/main" w="9525">
                   <a:solidFill>
                     <a:srgbClr val="000000"/>
                   </a:solidFill>
@@ -2349,7 +2352,7 @@
             </a:ln>
             <a:extLst>
               <a:ext uri="{91240B29-F687-4f45-9708-019B960494DF}">
-                <a14:hiddenLine xmlns:a14="http://schemas.microsoft.com/office/drawing/2010/main" xmlns="" w="9525">
+                <a14:hiddenLine xmlns="" xmlns:a14="http://schemas.microsoft.com/office/drawing/2010/main" w="9525">
                   <a:solidFill>
                     <a:srgbClr val="000000"/>
                   </a:solidFill>
@@ -2439,7 +2442,7 @@
             </a:ln>
             <a:extLst>
               <a:ext uri="{91240B29-F687-4f45-9708-019B960494DF}">
-                <a14:hiddenLine xmlns:a14="http://schemas.microsoft.com/office/drawing/2010/main" xmlns="" w="9525">
+                <a14:hiddenLine xmlns="" xmlns:a14="http://schemas.microsoft.com/office/drawing/2010/main" w="9525">
                   <a:solidFill>
                     <a:srgbClr val="000000"/>
                   </a:solidFill>
@@ -2501,7 +2504,7 @@
             </a:ln>
             <a:extLst>
               <a:ext uri="{91240B29-F687-4f45-9708-019B960494DF}">
-                <a14:hiddenLine xmlns:a14="http://schemas.microsoft.com/office/drawing/2010/main" xmlns="" w="9525">
+                <a14:hiddenLine xmlns="" xmlns:a14="http://schemas.microsoft.com/office/drawing/2010/main" w="9525">
                   <a:solidFill>
                     <a:srgbClr val="000000"/>
                   </a:solidFill>
@@ -2563,7 +2566,7 @@
             </a:ln>
             <a:extLst>
               <a:ext uri="{91240B29-F687-4f45-9708-019B960494DF}">
-                <a14:hiddenLine xmlns:a14="http://schemas.microsoft.com/office/drawing/2010/main" xmlns="" w="9525">
+                <a14:hiddenLine xmlns="" xmlns:a14="http://schemas.microsoft.com/office/drawing/2010/main" w="9525">
                   <a:solidFill>
                     <a:srgbClr val="000000"/>
                   </a:solidFill>
@@ -2653,7 +2656,7 @@
             </a:ln>
             <a:extLst>
               <a:ext uri="{91240B29-F687-4f45-9708-019B960494DF}">
-                <a14:hiddenLine xmlns:a14="http://schemas.microsoft.com/office/drawing/2010/main" xmlns="" w="9525">
+                <a14:hiddenLine xmlns="" xmlns:a14="http://schemas.microsoft.com/office/drawing/2010/main" w="9525">
                   <a:solidFill>
                     <a:srgbClr val="000000"/>
                   </a:solidFill>
@@ -2721,7 +2724,7 @@
             </a:ln>
             <a:extLst>
               <a:ext uri="{91240B29-F687-4f45-9708-019B960494DF}">
-                <a14:hiddenLine xmlns:a14="http://schemas.microsoft.com/office/drawing/2010/main" xmlns="" w="9525">
+                <a14:hiddenLine xmlns="" xmlns:a14="http://schemas.microsoft.com/office/drawing/2010/main" w="9525">
                   <a:solidFill>
                     <a:srgbClr val="000000"/>
                   </a:solidFill>
@@ -2783,7 +2786,7 @@
             </a:ln>
             <a:extLst>
               <a:ext uri="{91240B29-F687-4f45-9708-019B960494DF}">
-                <a14:hiddenLine xmlns:a14="http://schemas.microsoft.com/office/drawing/2010/main" xmlns="" w="9525">
+                <a14:hiddenLine xmlns="" xmlns:a14="http://schemas.microsoft.com/office/drawing/2010/main" w="9525">
                   <a:solidFill>
                     <a:srgbClr val="000000"/>
                   </a:solidFill>
@@ -2873,7 +2876,7 @@
             </a:ln>
             <a:extLst>
               <a:ext uri="{91240B29-F687-4f45-9708-019B960494DF}">
-                <a14:hiddenLine xmlns:a14="http://schemas.microsoft.com/office/drawing/2010/main" xmlns="" w="9525">
+                <a14:hiddenLine xmlns="" xmlns:a14="http://schemas.microsoft.com/office/drawing/2010/main" w="9525">
                   <a:solidFill>
                     <a:srgbClr val="000000"/>
                   </a:solidFill>
@@ -2935,7 +2938,7 @@
             </a:ln>
             <a:extLst>
               <a:ext uri="{91240B29-F687-4f45-9708-019B960494DF}">
-                <a14:hiddenLine xmlns:a14="http://schemas.microsoft.com/office/drawing/2010/main" xmlns="" w="9525">
+                <a14:hiddenLine xmlns="" xmlns:a14="http://schemas.microsoft.com/office/drawing/2010/main" w="9525">
                   <a:solidFill>
                     <a:srgbClr val="000000"/>
                   </a:solidFill>
@@ -3025,7 +3028,7 @@
             </a:ln>
             <a:extLst>
               <a:ext uri="{91240B29-F687-4f45-9708-019B960494DF}">
-                <a14:hiddenLine xmlns:a14="http://schemas.microsoft.com/office/drawing/2010/main" xmlns="" w="9525">
+                <a14:hiddenLine xmlns="" xmlns:a14="http://schemas.microsoft.com/office/drawing/2010/main" w="9525">
                   <a:solidFill>
                     <a:srgbClr val="000000"/>
                   </a:solidFill>
@@ -3087,7 +3090,7 @@
             </a:ln>
             <a:extLst>
               <a:ext uri="{91240B29-F687-4f45-9708-019B960494DF}">
-                <a14:hiddenLine xmlns:a14="http://schemas.microsoft.com/office/drawing/2010/main" xmlns="" w="9525">
+                <a14:hiddenLine xmlns="" xmlns:a14="http://schemas.microsoft.com/office/drawing/2010/main" w="9525">
                   <a:solidFill>
                     <a:srgbClr val="000000"/>
                   </a:solidFill>
@@ -3177,7 +3180,7 @@
             </a:ln>
             <a:extLst>
               <a:ext uri="{91240B29-F687-4f45-9708-019B960494DF}">
-                <a14:hiddenLine xmlns:a14="http://schemas.microsoft.com/office/drawing/2010/main" xmlns="" w="9525">
+                <a14:hiddenLine xmlns="" xmlns:a14="http://schemas.microsoft.com/office/drawing/2010/main" w="9525">
                   <a:solidFill>
                     <a:srgbClr val="000000"/>
                   </a:solidFill>
@@ -3211,7 +3214,7 @@
             </a:ln>
             <a:extLst>
               <a:ext uri="{91240B29-F687-4f45-9708-019B960494DF}">
-                <a14:hiddenLine xmlns:a14="http://schemas.microsoft.com/office/drawing/2010/main" xmlns="" w="9525">
+                <a14:hiddenLine xmlns="" xmlns:a14="http://schemas.microsoft.com/office/drawing/2010/main" w="9525">
                   <a:solidFill>
                     <a:srgbClr val="000000"/>
                   </a:solidFill>
@@ -3276,7 +3279,7 @@
             </a:ln>
             <a:extLst>
               <a:ext uri="{91240B29-F687-4f45-9708-019B960494DF}">
-                <a14:hiddenLine xmlns:a14="http://schemas.microsoft.com/office/drawing/2010/main" xmlns="" w="9525">
+                <a14:hiddenLine xmlns="" xmlns:a14="http://schemas.microsoft.com/office/drawing/2010/main" w="9525">
                   <a:solidFill>
                     <a:srgbClr val="000000"/>
                   </a:solidFill>
@@ -3366,7 +3369,7 @@
             </a:ln>
             <a:extLst>
               <a:ext uri="{91240B29-F687-4f45-9708-019B960494DF}">
-                <a14:hiddenLine xmlns:a14="http://schemas.microsoft.com/office/drawing/2010/main" xmlns="" w="9525">
+                <a14:hiddenLine xmlns="" xmlns:a14="http://schemas.microsoft.com/office/drawing/2010/main" w="9525">
                   <a:solidFill>
                     <a:srgbClr val="000000"/>
                   </a:solidFill>
@@ -3428,7 +3431,7 @@
             </a:ln>
             <a:extLst>
               <a:ext uri="{91240B29-F687-4f45-9708-019B960494DF}">
-                <a14:hiddenLine xmlns:a14="http://schemas.microsoft.com/office/drawing/2010/main" xmlns="" w="9525">
+                <a14:hiddenLine xmlns="" xmlns:a14="http://schemas.microsoft.com/office/drawing/2010/main" w="9525">
                   <a:solidFill>
                     <a:srgbClr val="000000"/>
                   </a:solidFill>
@@ -3518,7 +3521,7 @@
             </a:ln>
             <a:extLst>
               <a:ext uri="{91240B29-F687-4f45-9708-019B960494DF}">
-                <a14:hiddenLine xmlns:a14="http://schemas.microsoft.com/office/drawing/2010/main" xmlns="" w="9525">
+                <a14:hiddenLine xmlns="" xmlns:a14="http://schemas.microsoft.com/office/drawing/2010/main" w="9525">
                   <a:solidFill>
                     <a:srgbClr val="000000"/>
                   </a:solidFill>
@@ -3608,7 +3611,7 @@
             </a:ln>
             <a:extLst>
               <a:ext uri="{91240B29-F687-4f45-9708-019B960494DF}">
-                <a14:hiddenLine xmlns:a14="http://schemas.microsoft.com/office/drawing/2010/main" xmlns="" w="9525">
+                <a14:hiddenLine xmlns="" xmlns:a14="http://schemas.microsoft.com/office/drawing/2010/main" w="9525">
                   <a:solidFill>
                     <a:srgbClr val="000000"/>
                   </a:solidFill>
@@ -3673,7 +3676,7 @@
             </a:ln>
             <a:extLst>
               <a:ext uri="{91240B29-F687-4f45-9708-019B960494DF}">
-                <a14:hiddenLine xmlns:a14="http://schemas.microsoft.com/office/drawing/2010/main" xmlns="" w="9525">
+                <a14:hiddenLine xmlns="" xmlns:a14="http://schemas.microsoft.com/office/drawing/2010/main" w="9525">
                   <a:solidFill>
                     <a:srgbClr val="000000"/>
                   </a:solidFill>
@@ -3735,7 +3738,7 @@
             </a:ln>
             <a:extLst>
               <a:ext uri="{91240B29-F687-4f45-9708-019B960494DF}">
-                <a14:hiddenLine xmlns:a14="http://schemas.microsoft.com/office/drawing/2010/main" xmlns="" w="9525">
+                <a14:hiddenLine xmlns="" xmlns:a14="http://schemas.microsoft.com/office/drawing/2010/main" w="9525">
                   <a:solidFill>
                     <a:srgbClr val="000000"/>
                   </a:solidFill>
@@ -3825,7 +3828,7 @@
             </a:ln>
             <a:extLst>
               <a:ext uri="{91240B29-F687-4f45-9708-019B960494DF}">
-                <a14:hiddenLine xmlns:a14="http://schemas.microsoft.com/office/drawing/2010/main" xmlns="" w="9525">
+                <a14:hiddenLine xmlns="" xmlns:a14="http://schemas.microsoft.com/office/drawing/2010/main" w="9525">
                   <a:solidFill>
                     <a:srgbClr val="000000"/>
                   </a:solidFill>
@@ -3915,7 +3918,7 @@
             </a:ln>
             <a:extLst>
               <a:ext uri="{91240B29-F687-4f45-9708-019B960494DF}">
-                <a14:hiddenLine xmlns:a14="http://schemas.microsoft.com/office/drawing/2010/main" xmlns="" w="9525">
+                <a14:hiddenLine xmlns="" xmlns:a14="http://schemas.microsoft.com/office/drawing/2010/main" w="9525">
                   <a:solidFill>
                     <a:srgbClr val="000000"/>
                   </a:solidFill>
@@ -3977,7 +3980,7 @@
             </a:ln>
             <a:extLst>
               <a:ext uri="{91240B29-F687-4f45-9708-019B960494DF}">
-                <a14:hiddenLine xmlns:a14="http://schemas.microsoft.com/office/drawing/2010/main" xmlns="" w="9525">
+                <a14:hiddenLine xmlns="" xmlns:a14="http://schemas.microsoft.com/office/drawing/2010/main" w="9525">
                   <a:solidFill>
                     <a:srgbClr val="000000"/>
                   </a:solidFill>
@@ -4097,7 +4100,7 @@
             </a:ln>
             <a:extLst>
               <a:ext uri="{91240B29-F687-4f45-9708-019B960494DF}">
-                <a14:hiddenLine xmlns:a14="http://schemas.microsoft.com/office/drawing/2010/main" xmlns="" w="9525">
+                <a14:hiddenLine xmlns="" xmlns:a14="http://schemas.microsoft.com/office/drawing/2010/main" w="9525">
                   <a:solidFill>
                     <a:srgbClr val="000000"/>
                   </a:solidFill>
@@ -4165,7 +4168,7 @@
             </a:ln>
             <a:extLst>
               <a:ext uri="{91240B29-F687-4f45-9708-019B960494DF}">
-                <a14:hiddenLine xmlns:a14="http://schemas.microsoft.com/office/drawing/2010/main" xmlns="" w="9525">
+                <a14:hiddenLine xmlns="" xmlns:a14="http://schemas.microsoft.com/office/drawing/2010/main" w="9525">
                   <a:solidFill>
                     <a:srgbClr val="000000"/>
                   </a:solidFill>
@@ -4255,7 +4258,7 @@
             </a:ln>
             <a:extLst>
               <a:ext uri="{91240B29-F687-4f45-9708-019B960494DF}">
-                <a14:hiddenLine xmlns:a14="http://schemas.microsoft.com/office/drawing/2010/main" xmlns="" w="9525">
+                <a14:hiddenLine xmlns="" xmlns:a14="http://schemas.microsoft.com/office/drawing/2010/main" w="9525">
                   <a:solidFill>
                     <a:srgbClr val="000000"/>
                   </a:solidFill>
@@ -4395,7 +4398,7 @@
           <a:p>
             <a:fld id="{48A87A34-81AB-432B-8DAE-1953F412C126}" type="datetimeFigureOut">
               <a:rPr lang="en-US" dirty="0"/>
-              <a:t>8/4/2018</a:t>
+              <a:t>8/6/2018</a:t>
             </a:fld>
             <a:endParaRPr lang="en-US" dirty="0"/>
           </a:p>
@@ -4657,7 +4660,7 @@
           <a:p>
             <a:fld id="{48A87A34-81AB-432B-8DAE-1953F412C126}" type="datetimeFigureOut">
               <a:rPr lang="en-US" dirty="0"/>
-              <a:t>8/4/2018</a:t>
+              <a:t>8/6/2018</a:t>
             </a:fld>
             <a:endParaRPr lang="en-US" dirty="0"/>
           </a:p>
@@ -4848,7 +4851,7 @@
           <a:p>
             <a:fld id="{48A87A34-81AB-432B-8DAE-1953F412C126}" type="datetimeFigureOut">
               <a:rPr lang="en-US" dirty="0"/>
-              <a:t>8/4/2018</a:t>
+              <a:t>8/6/2018</a:t>
             </a:fld>
             <a:endParaRPr lang="en-US" dirty="0"/>
           </a:p>
@@ -5106,7 +5109,7 @@
           <a:p>
             <a:fld id="{48A87A34-81AB-432B-8DAE-1953F412C126}" type="datetimeFigureOut">
               <a:rPr lang="en-US" dirty="0"/>
-              <a:t>8/4/2018</a:t>
+              <a:t>8/6/2018</a:t>
             </a:fld>
             <a:endParaRPr lang="en-US" dirty="0"/>
           </a:p>
@@ -5535,7 +5538,7 @@
           <a:p>
             <a:fld id="{48A87A34-81AB-432B-8DAE-1953F412C126}" type="datetimeFigureOut">
               <a:rPr lang="en-US" dirty="0"/>
-              <a:t>8/4/2018</a:t>
+              <a:t>8/6/2018</a:t>
             </a:fld>
             <a:endParaRPr lang="en-US" dirty="0"/>
           </a:p>
@@ -6076,7 +6079,7 @@
           <a:p>
             <a:fld id="{48A87A34-81AB-432B-8DAE-1953F412C126}" type="datetimeFigureOut">
               <a:rPr lang="en-US" dirty="0"/>
-              <a:t>8/4/2018</a:t>
+              <a:t>8/6/2018</a:t>
             </a:fld>
             <a:endParaRPr lang="en-US" dirty="0"/>
           </a:p>
@@ -6791,7 +6794,7 @@
           <a:p>
             <a:fld id="{48A87A34-81AB-432B-8DAE-1953F412C126}" type="datetimeFigureOut">
               <a:rPr lang="en-US" dirty="0"/>
-              <a:t>8/4/2018</a:t>
+              <a:t>8/6/2018</a:t>
             </a:fld>
             <a:endParaRPr lang="en-US" dirty="0"/>
           </a:p>
@@ -6956,7 +6959,7 @@
           <a:p>
             <a:fld id="{48A87A34-81AB-432B-8DAE-1953F412C126}" type="datetimeFigureOut">
               <a:rPr lang="en-US" dirty="0"/>
-              <a:t>8/4/2018</a:t>
+              <a:t>8/6/2018</a:t>
             </a:fld>
             <a:endParaRPr lang="en-US" dirty="0"/>
           </a:p>
@@ -7131,7 +7134,7 @@
           <a:p>
             <a:fld id="{48A87A34-81AB-432B-8DAE-1953F412C126}" type="datetimeFigureOut">
               <a:rPr lang="en-US" dirty="0"/>
-              <a:t>8/4/2018</a:t>
+              <a:t>8/6/2018</a:t>
             </a:fld>
             <a:endParaRPr lang="en-US" dirty="0"/>
           </a:p>
@@ -7296,7 +7299,7 @@
           <a:p>
             <a:fld id="{48A87A34-81AB-432B-8DAE-1953F412C126}" type="datetimeFigureOut">
               <a:rPr lang="en-US" dirty="0"/>
-              <a:t>8/4/2018</a:t>
+              <a:t>8/6/2018</a:t>
             </a:fld>
             <a:endParaRPr lang="en-US" dirty="0"/>
           </a:p>
@@ -7541,7 +7544,7 @@
           <a:p>
             <a:fld id="{48A87A34-81AB-432B-8DAE-1953F412C126}" type="datetimeFigureOut">
               <a:rPr lang="en-US" dirty="0"/>
-              <a:t>8/4/2018</a:t>
+              <a:t>8/6/2018</a:t>
             </a:fld>
             <a:endParaRPr lang="en-US" dirty="0"/>
           </a:p>
@@ -7768,7 +7771,7 @@
           <a:p>
             <a:fld id="{48A87A34-81AB-432B-8DAE-1953F412C126}" type="datetimeFigureOut">
               <a:rPr lang="en-US" dirty="0"/>
-              <a:t>8/4/2018</a:t>
+              <a:t>8/6/2018</a:t>
             </a:fld>
             <a:endParaRPr lang="en-US" dirty="0"/>
           </a:p>
@@ -8144,7 +8147,7 @@
           <a:p>
             <a:fld id="{48A87A34-81AB-432B-8DAE-1953F412C126}" type="datetimeFigureOut">
               <a:rPr lang="en-US" dirty="0"/>
-              <a:t>8/4/2018</a:t>
+              <a:t>8/6/2018</a:t>
             </a:fld>
             <a:endParaRPr lang="en-US" dirty="0"/>
           </a:p>
@@ -8257,7 +8260,7 @@
           <a:p>
             <a:fld id="{48A87A34-81AB-432B-8DAE-1953F412C126}" type="datetimeFigureOut">
               <a:rPr lang="en-US" dirty="0"/>
-              <a:t>8/4/2018</a:t>
+              <a:t>8/6/2018</a:t>
             </a:fld>
             <a:endParaRPr lang="en-US" dirty="0"/>
           </a:p>
@@ -8347,7 +8350,7 @@
           <a:p>
             <a:fld id="{48A87A34-81AB-432B-8DAE-1953F412C126}" type="datetimeFigureOut">
               <a:rPr lang="en-US" dirty="0"/>
-              <a:t>8/4/2018</a:t>
+              <a:t>8/6/2018</a:t>
             </a:fld>
             <a:endParaRPr lang="en-US" dirty="0"/>
           </a:p>
@@ -8591,7 +8594,7 @@
           <a:p>
             <a:fld id="{48A87A34-81AB-432B-8DAE-1953F412C126}" type="datetimeFigureOut">
               <a:rPr lang="en-US" dirty="0"/>
-              <a:t>8/4/2018</a:t>
+              <a:t>8/6/2018</a:t>
             </a:fld>
             <a:endParaRPr lang="en-US" dirty="0"/>
           </a:p>
@@ -8866,7 +8869,7 @@
           <a:p>
             <a:fld id="{48A87A34-81AB-432B-8DAE-1953F412C126}" type="datetimeFigureOut">
               <a:rPr lang="en-US" dirty="0"/>
-              <a:t>8/4/2018</a:t>
+              <a:t>8/6/2018</a:t>
             </a:fld>
             <a:endParaRPr lang="en-US" dirty="0"/>
           </a:p>
@@ -8977,7 +8980,7 @@
           <a:noFill/>
           <a:extLst>
             <a:ext uri="{909E8E84-426E-40dd-AFC4-6F175D3DCCD1}">
-              <a14:hiddenFill xmlns:a14="http://schemas.microsoft.com/office/drawing/2010/main" xmlns="">
+              <a14:hiddenFill xmlns="" xmlns:a14="http://schemas.microsoft.com/office/drawing/2010/main">
                 <a:solidFill>
                   <a:srgbClr val="FFFFFF"/>
                 </a:solidFill>
@@ -9051,7 +9054,7 @@
               </a:ln>
               <a:extLst>
                 <a:ext uri="{91240B29-F687-4f45-9708-019B960494DF}">
-                  <a14:hiddenLine xmlns:a14="http://schemas.microsoft.com/office/drawing/2010/main" xmlns="" w="9525">
+                  <a14:hiddenLine xmlns="" xmlns:a14="http://schemas.microsoft.com/office/drawing/2010/main" w="9525">
                     <a:solidFill>
                       <a:srgbClr val="000000"/>
                     </a:solidFill>
@@ -9141,7 +9144,7 @@
               </a:ln>
               <a:extLst>
                 <a:ext uri="{91240B29-F687-4f45-9708-019B960494DF}">
-                  <a14:hiddenLine xmlns:a14="http://schemas.microsoft.com/office/drawing/2010/main" xmlns="" w="9525">
+                  <a14:hiddenLine xmlns="" xmlns:a14="http://schemas.microsoft.com/office/drawing/2010/main" w="9525">
                     <a:solidFill>
                       <a:srgbClr val="000000"/>
                     </a:solidFill>
@@ -9231,7 +9234,7 @@
               </a:ln>
               <a:extLst>
                 <a:ext uri="{91240B29-F687-4f45-9708-019B960494DF}">
-                  <a14:hiddenLine xmlns:a14="http://schemas.microsoft.com/office/drawing/2010/main" xmlns="" w="9525">
+                  <a14:hiddenLine xmlns="" xmlns:a14="http://schemas.microsoft.com/office/drawing/2010/main" w="9525">
                     <a:solidFill>
                       <a:srgbClr val="000000"/>
                     </a:solidFill>
@@ -9293,7 +9296,7 @@
               </a:ln>
               <a:extLst>
                 <a:ext uri="{91240B29-F687-4f45-9708-019B960494DF}">
-                  <a14:hiddenLine xmlns:a14="http://schemas.microsoft.com/office/drawing/2010/main" xmlns="" w="9525">
+                  <a14:hiddenLine xmlns="" xmlns:a14="http://schemas.microsoft.com/office/drawing/2010/main" w="9525">
                     <a:solidFill>
                       <a:srgbClr val="000000"/>
                     </a:solidFill>
@@ -9383,7 +9386,7 @@
               </a:ln>
               <a:extLst>
                 <a:ext uri="{91240B29-F687-4f45-9708-019B960494DF}">
-                  <a14:hiddenLine xmlns:a14="http://schemas.microsoft.com/office/drawing/2010/main" xmlns="" w="9525">
+                  <a14:hiddenLine xmlns="" xmlns:a14="http://schemas.microsoft.com/office/drawing/2010/main" w="9525">
                     <a:solidFill>
                       <a:srgbClr val="000000"/>
                     </a:solidFill>
@@ -9445,7 +9448,7 @@
               </a:ln>
               <a:extLst>
                 <a:ext uri="{91240B29-F687-4f45-9708-019B960494DF}">
-                  <a14:hiddenLine xmlns:a14="http://schemas.microsoft.com/office/drawing/2010/main" xmlns="" w="9525">
+                  <a14:hiddenLine xmlns="" xmlns:a14="http://schemas.microsoft.com/office/drawing/2010/main" w="9525">
                     <a:solidFill>
                       <a:srgbClr val="000000"/>
                     </a:solidFill>
@@ -9507,7 +9510,7 @@
               </a:ln>
               <a:extLst>
                 <a:ext uri="{91240B29-F687-4f45-9708-019B960494DF}">
-                  <a14:hiddenLine xmlns:a14="http://schemas.microsoft.com/office/drawing/2010/main" xmlns="" w="9525">
+                  <a14:hiddenLine xmlns="" xmlns:a14="http://schemas.microsoft.com/office/drawing/2010/main" w="9525">
                     <a:solidFill>
                       <a:srgbClr val="000000"/>
                     </a:solidFill>
@@ -9597,7 +9600,7 @@
               </a:ln>
               <a:extLst>
                 <a:ext uri="{91240B29-F687-4f45-9708-019B960494DF}">
-                  <a14:hiddenLine xmlns:a14="http://schemas.microsoft.com/office/drawing/2010/main" xmlns="" w="9525">
+                  <a14:hiddenLine xmlns="" xmlns:a14="http://schemas.microsoft.com/office/drawing/2010/main" w="9525">
                     <a:solidFill>
                       <a:srgbClr val="000000"/>
                     </a:solidFill>
@@ -9687,7 +9690,7 @@
               </a:ln>
               <a:extLst>
                 <a:ext uri="{91240B29-F687-4f45-9708-019B960494DF}">
-                  <a14:hiddenLine xmlns:a14="http://schemas.microsoft.com/office/drawing/2010/main" xmlns="" w="9525">
+                  <a14:hiddenLine xmlns="" xmlns:a14="http://schemas.microsoft.com/office/drawing/2010/main" w="9525">
                     <a:solidFill>
                       <a:srgbClr val="000000"/>
                     </a:solidFill>
@@ -9749,7 +9752,7 @@
               </a:ln>
               <a:extLst>
                 <a:ext uri="{91240B29-F687-4f45-9708-019B960494DF}">
-                  <a14:hiddenLine xmlns:a14="http://schemas.microsoft.com/office/drawing/2010/main" xmlns="" w="9525">
+                  <a14:hiddenLine xmlns="" xmlns:a14="http://schemas.microsoft.com/office/drawing/2010/main" w="9525">
                     <a:solidFill>
                       <a:srgbClr val="000000"/>
                     </a:solidFill>
@@ -9859,7 +9862,7 @@
               </a:ln>
               <a:extLst>
                 <a:ext uri="{91240B29-F687-4f45-9708-019B960494DF}">
-                  <a14:hiddenLine xmlns:a14="http://schemas.microsoft.com/office/drawing/2010/main" xmlns="" w="9525">
+                  <a14:hiddenLine xmlns="" xmlns:a14="http://schemas.microsoft.com/office/drawing/2010/main" w="9525">
                     <a:solidFill>
                       <a:srgbClr val="000000"/>
                     </a:solidFill>
@@ -9943,7 +9946,7 @@
               </a:ln>
               <a:extLst>
                 <a:ext uri="{91240B29-F687-4f45-9708-019B960494DF}">
-                  <a14:hiddenLine xmlns:a14="http://schemas.microsoft.com/office/drawing/2010/main" xmlns="" w="9525">
+                  <a14:hiddenLine xmlns="" xmlns:a14="http://schemas.microsoft.com/office/drawing/2010/main" w="9525">
                     <a:solidFill>
                       <a:srgbClr val="000000"/>
                     </a:solidFill>
@@ -10005,7 +10008,7 @@
               </a:ln>
               <a:extLst>
                 <a:ext uri="{91240B29-F687-4f45-9708-019B960494DF}">
-                  <a14:hiddenLine xmlns:a14="http://schemas.microsoft.com/office/drawing/2010/main" xmlns="" w="9525">
+                  <a14:hiddenLine xmlns="" xmlns:a14="http://schemas.microsoft.com/office/drawing/2010/main" w="9525">
                     <a:solidFill>
                       <a:srgbClr val="000000"/>
                     </a:solidFill>
@@ -10067,7 +10070,7 @@
               </a:ln>
               <a:extLst>
                 <a:ext uri="{91240B29-F687-4f45-9708-019B960494DF}">
-                  <a14:hiddenLine xmlns:a14="http://schemas.microsoft.com/office/drawing/2010/main" xmlns="" w="9525">
+                  <a14:hiddenLine xmlns="" xmlns:a14="http://schemas.microsoft.com/office/drawing/2010/main" w="9525">
                     <a:solidFill>
                       <a:srgbClr val="000000"/>
                     </a:solidFill>
@@ -10157,7 +10160,7 @@
               </a:ln>
               <a:extLst>
                 <a:ext uri="{91240B29-F687-4f45-9708-019B960494DF}">
-                  <a14:hiddenLine xmlns:a14="http://schemas.microsoft.com/office/drawing/2010/main" xmlns="" w="9525">
+                  <a14:hiddenLine xmlns="" xmlns:a14="http://schemas.microsoft.com/office/drawing/2010/main" w="9525">
                     <a:solidFill>
                       <a:srgbClr val="000000"/>
                     </a:solidFill>
@@ -10191,7 +10194,7 @@
               </a:ln>
               <a:extLst>
                 <a:ext uri="{91240B29-F687-4f45-9708-019B960494DF}">
-                  <a14:hiddenLine xmlns:a14="http://schemas.microsoft.com/office/drawing/2010/main" xmlns="" w="9525">
+                  <a14:hiddenLine xmlns="" xmlns:a14="http://schemas.microsoft.com/office/drawing/2010/main" w="9525">
                     <a:solidFill>
                       <a:srgbClr val="000000"/>
                     </a:solidFill>
@@ -10256,7 +10259,7 @@
               </a:ln>
               <a:extLst>
                 <a:ext uri="{91240B29-F687-4f45-9708-019B960494DF}">
-                  <a14:hiddenLine xmlns:a14="http://schemas.microsoft.com/office/drawing/2010/main" xmlns="" w="9525">
+                  <a14:hiddenLine xmlns="" xmlns:a14="http://schemas.microsoft.com/office/drawing/2010/main" w="9525">
                     <a:solidFill>
                       <a:srgbClr val="000000"/>
                     </a:solidFill>
@@ -10346,7 +10349,7 @@
               </a:ln>
               <a:extLst>
                 <a:ext uri="{91240B29-F687-4f45-9708-019B960494DF}">
-                  <a14:hiddenLine xmlns:a14="http://schemas.microsoft.com/office/drawing/2010/main" xmlns="" w="9525">
+                  <a14:hiddenLine xmlns="" xmlns:a14="http://schemas.microsoft.com/office/drawing/2010/main" w="9525">
                     <a:solidFill>
                       <a:srgbClr val="000000"/>
                     </a:solidFill>
@@ -10408,7 +10411,7 @@
               </a:ln>
               <a:extLst>
                 <a:ext uri="{91240B29-F687-4f45-9708-019B960494DF}">
-                  <a14:hiddenLine xmlns:a14="http://schemas.microsoft.com/office/drawing/2010/main" xmlns="" w="9525">
+                  <a14:hiddenLine xmlns="" xmlns:a14="http://schemas.microsoft.com/office/drawing/2010/main" w="9525">
                     <a:solidFill>
                       <a:srgbClr val="000000"/>
                     </a:solidFill>
@@ -10498,7 +10501,7 @@
               </a:ln>
               <a:extLst>
                 <a:ext uri="{91240B29-F687-4f45-9708-019B960494DF}">
-                  <a14:hiddenLine xmlns:a14="http://schemas.microsoft.com/office/drawing/2010/main" xmlns="" w="9525">
+                  <a14:hiddenLine xmlns="" xmlns:a14="http://schemas.microsoft.com/office/drawing/2010/main" w="9525">
                     <a:solidFill>
                       <a:srgbClr val="000000"/>
                     </a:solidFill>
@@ -10563,7 +10566,7 @@
               </a:ln>
               <a:extLst>
                 <a:ext uri="{91240B29-F687-4f45-9708-019B960494DF}">
-                  <a14:hiddenLine xmlns:a14="http://schemas.microsoft.com/office/drawing/2010/main" xmlns="" w="9525">
+                  <a14:hiddenLine xmlns="" xmlns:a14="http://schemas.microsoft.com/office/drawing/2010/main" w="9525">
                     <a:solidFill>
                       <a:srgbClr val="000000"/>
                     </a:solidFill>
@@ -10625,7 +10628,7 @@
               </a:ln>
               <a:extLst>
                 <a:ext uri="{91240B29-F687-4f45-9708-019B960494DF}">
-                  <a14:hiddenLine xmlns:a14="http://schemas.microsoft.com/office/drawing/2010/main" xmlns="" w="9525">
+                  <a14:hiddenLine xmlns="" xmlns:a14="http://schemas.microsoft.com/office/drawing/2010/main" w="9525">
                     <a:solidFill>
                       <a:srgbClr val="000000"/>
                     </a:solidFill>
@@ -10715,7 +10718,7 @@
               </a:ln>
               <a:extLst>
                 <a:ext uri="{91240B29-F687-4f45-9708-019B960494DF}">
-                  <a14:hiddenLine xmlns:a14="http://schemas.microsoft.com/office/drawing/2010/main" xmlns="" w="9525">
+                  <a14:hiddenLine xmlns="" xmlns:a14="http://schemas.microsoft.com/office/drawing/2010/main" w="9525">
                     <a:solidFill>
                       <a:srgbClr val="000000"/>
                     </a:solidFill>
@@ -10805,7 +10808,7 @@
               </a:ln>
               <a:extLst>
                 <a:ext uri="{91240B29-F687-4f45-9708-019B960494DF}">
-                  <a14:hiddenLine xmlns:a14="http://schemas.microsoft.com/office/drawing/2010/main" xmlns="" w="9525">
+                  <a14:hiddenLine xmlns="" xmlns:a14="http://schemas.microsoft.com/office/drawing/2010/main" w="9525">
                     <a:solidFill>
                       <a:srgbClr val="000000"/>
                     </a:solidFill>
@@ -10870,7 +10873,7 @@
               </a:ln>
               <a:extLst>
                 <a:ext uri="{91240B29-F687-4f45-9708-019B960494DF}">
-                  <a14:hiddenLine xmlns:a14="http://schemas.microsoft.com/office/drawing/2010/main" xmlns="" w="9525">
+                  <a14:hiddenLine xmlns="" xmlns:a14="http://schemas.microsoft.com/office/drawing/2010/main" w="9525">
                     <a:solidFill>
                       <a:srgbClr val="000000"/>
                     </a:solidFill>
@@ -10990,7 +10993,7 @@
               </a:ln>
               <a:extLst>
                 <a:ext uri="{91240B29-F687-4f45-9708-019B960494DF}">
-                  <a14:hiddenLine xmlns:a14="http://schemas.microsoft.com/office/drawing/2010/main" xmlns="" w="9525">
+                  <a14:hiddenLine xmlns="" xmlns:a14="http://schemas.microsoft.com/office/drawing/2010/main" w="9525">
                     <a:solidFill>
                       <a:srgbClr val="000000"/>
                     </a:solidFill>
@@ -11088,7 +11091,7 @@
               </a:ln>
               <a:extLst>
                 <a:ext uri="{91240B29-F687-4f45-9708-019B960494DF}">
-                  <a14:hiddenLine xmlns:a14="http://schemas.microsoft.com/office/drawing/2010/main" xmlns="" w="9525">
+                  <a14:hiddenLine xmlns="" xmlns:a14="http://schemas.microsoft.com/office/drawing/2010/main" w="9525">
                     <a:solidFill>
                       <a:srgbClr val="000000"/>
                     </a:solidFill>
@@ -11203,7 +11206,7 @@
               </a:ln>
               <a:extLst>
                 <a:ext uri="{91240B29-F687-4f45-9708-019B960494DF}">
-                  <a14:hiddenLine xmlns:a14="http://schemas.microsoft.com/office/drawing/2010/main" xmlns="" w="9525">
+                  <a14:hiddenLine xmlns="" xmlns:a14="http://schemas.microsoft.com/office/drawing/2010/main" w="9525">
                     <a:solidFill>
                       <a:srgbClr val="000000"/>
                     </a:solidFill>
@@ -11293,7 +11296,7 @@
               </a:ln>
               <a:extLst>
                 <a:ext uri="{91240B29-F687-4f45-9708-019B960494DF}">
-                  <a14:hiddenLine xmlns:a14="http://schemas.microsoft.com/office/drawing/2010/main" xmlns="" w="9525">
+                  <a14:hiddenLine xmlns="" xmlns:a14="http://schemas.microsoft.com/office/drawing/2010/main" w="9525">
                     <a:solidFill>
                       <a:srgbClr val="000000"/>
                     </a:solidFill>
@@ -11358,7 +11361,7 @@
               </a:ln>
               <a:extLst>
                 <a:ext uri="{91240B29-F687-4f45-9708-019B960494DF}">
-                  <a14:hiddenLine xmlns:a14="http://schemas.microsoft.com/office/drawing/2010/main" xmlns="" w="9525">
+                  <a14:hiddenLine xmlns="" xmlns:a14="http://schemas.microsoft.com/office/drawing/2010/main" w="9525">
                     <a:solidFill>
                       <a:srgbClr val="000000"/>
                     </a:solidFill>
@@ -11448,7 +11451,7 @@
               </a:ln>
               <a:extLst>
                 <a:ext uri="{91240B29-F687-4f45-9708-019B960494DF}">
-                  <a14:hiddenLine xmlns:a14="http://schemas.microsoft.com/office/drawing/2010/main" xmlns="" w="9525">
+                  <a14:hiddenLine xmlns="" xmlns:a14="http://schemas.microsoft.com/office/drawing/2010/main" w="9525">
                     <a:solidFill>
                       <a:srgbClr val="000000"/>
                     </a:solidFill>
@@ -11516,7 +11519,7 @@
               </a:ln>
               <a:extLst>
                 <a:ext uri="{91240B29-F687-4f45-9708-019B960494DF}">
-                  <a14:hiddenLine xmlns:a14="http://schemas.microsoft.com/office/drawing/2010/main" xmlns="" w="9525">
+                  <a14:hiddenLine xmlns="" xmlns:a14="http://schemas.microsoft.com/office/drawing/2010/main" w="9525">
                     <a:solidFill>
                       <a:srgbClr val="000000"/>
                     </a:solidFill>
@@ -11606,7 +11609,7 @@
               </a:ln>
               <a:extLst>
                 <a:ext uri="{91240B29-F687-4f45-9708-019B960494DF}">
-                  <a14:hiddenLine xmlns:a14="http://schemas.microsoft.com/office/drawing/2010/main" xmlns="" w="9525">
+                  <a14:hiddenLine xmlns="" xmlns:a14="http://schemas.microsoft.com/office/drawing/2010/main" w="9525">
                     <a:solidFill>
                       <a:srgbClr val="000000"/>
                     </a:solidFill>
@@ -11674,7 +11677,7 @@
               </a:ln>
               <a:extLst>
                 <a:ext uri="{91240B29-F687-4f45-9708-019B960494DF}">
-                  <a14:hiddenLine xmlns:a14="http://schemas.microsoft.com/office/drawing/2010/main" xmlns="" w="9525">
+                  <a14:hiddenLine xmlns="" xmlns:a14="http://schemas.microsoft.com/office/drawing/2010/main" w="9525">
                     <a:solidFill>
                       <a:srgbClr val="000000"/>
                     </a:solidFill>
@@ -11764,7 +11767,7 @@
               </a:ln>
               <a:extLst>
                 <a:ext uri="{91240B29-F687-4f45-9708-019B960494DF}">
-                  <a14:hiddenLine xmlns:a14="http://schemas.microsoft.com/office/drawing/2010/main" xmlns="" w="9525">
+                  <a14:hiddenLine xmlns="" xmlns:a14="http://schemas.microsoft.com/office/drawing/2010/main" w="9525">
                     <a:solidFill>
                       <a:srgbClr val="000000"/>
                     </a:solidFill>
@@ -11798,7 +11801,7 @@
               </a:ln>
               <a:extLst>
                 <a:ext uri="{91240B29-F687-4f45-9708-019B960494DF}">
-                  <a14:hiddenLine xmlns:a14="http://schemas.microsoft.com/office/drawing/2010/main" xmlns="" w="9525">
+                  <a14:hiddenLine xmlns="" xmlns:a14="http://schemas.microsoft.com/office/drawing/2010/main" w="9525">
                     <a:solidFill>
                       <a:srgbClr val="000000"/>
                     </a:solidFill>
@@ -11939,7 +11942,7 @@
             <a:fld id="{48A87A34-81AB-432B-8DAE-1953F412C126}" type="datetimeFigureOut">
               <a:rPr lang="en-US" dirty="0"/>
               <a:pPr/>
-              <a:t>8/4/2018</a:t>
+              <a:t>8/6/2018</a:t>
             </a:fld>
             <a:endParaRPr lang="en-US" dirty="0"/>
           </a:p>
@@ -12438,6 +12441,216 @@
 </p:sld>
 </file>
 
+<file path=ppt/slides/slide10.xml><?xml version="1.0" encoding="utf-8"?>
+<p:sld xmlns:a="http://schemas.openxmlformats.org/drawingml/2006/main" xmlns:r="http://schemas.openxmlformats.org/officeDocument/2006/relationships" xmlns:p="http://schemas.openxmlformats.org/presentationml/2006/main">
+  <p:cSld>
+    <p:spTree>
+      <p:nvGrpSpPr>
+        <p:cNvPr id="1" name=""/>
+        <p:cNvGrpSpPr/>
+        <p:nvPr/>
+      </p:nvGrpSpPr>
+      <p:grpSpPr>
+        <a:xfrm>
+          <a:off x="0" y="0"/>
+          <a:ext cx="0" cy="0"/>
+          <a:chOff x="0" y="0"/>
+          <a:chExt cx="0" cy="0"/>
+        </a:xfrm>
+      </p:grpSpPr>
+      <p:sp>
+        <p:nvSpPr>
+          <p:cNvPr id="2" name="Title 1">
+            <a:extLst>
+              <a:ext uri="{FF2B5EF4-FFF2-40B4-BE49-F238E27FC236}">
+                <a16:creationId xmlns:a16="http://schemas.microsoft.com/office/drawing/2014/main" id="{C94CB277-F835-4F78-B5AB-5A260F27EA6C}"/>
+              </a:ext>
+            </a:extLst>
+          </p:cNvPr>
+          <p:cNvSpPr>
+            <a:spLocks noGrp="1"/>
+          </p:cNvSpPr>
+          <p:nvPr>
+            <p:ph type="title"/>
+          </p:nvPr>
+        </p:nvSpPr>
+        <p:spPr/>
+        <p:txBody>
+          <a:bodyPr/>
+          <a:lstStyle/>
+          <a:p>
+            <a:r>
+              <a:rPr lang="en-US" dirty="0"/>
+              <a:t>Code</a:t>
+            </a:r>
+          </a:p>
+        </p:txBody>
+      </p:sp>
+      <p:pic>
+        <p:nvPicPr>
+          <p:cNvPr id="4" name="Content Placeholder 3">
+            <a:extLst>
+              <a:ext uri="{FF2B5EF4-FFF2-40B4-BE49-F238E27FC236}">
+                <a16:creationId xmlns:a16="http://schemas.microsoft.com/office/drawing/2014/main" id="{63CB934F-CA35-4819-BF19-A3619AA74D67}"/>
+              </a:ext>
+            </a:extLst>
+          </p:cNvPr>
+          <p:cNvPicPr>
+            <a:picLocks noGrp="1" noChangeAspect="1"/>
+          </p:cNvPicPr>
+          <p:nvPr>
+            <p:ph idx="1"/>
+          </p:nvPr>
+        </p:nvPicPr>
+        <p:blipFill>
+          <a:blip r:embed="rId2"/>
+          <a:stretch>
+            <a:fillRect/>
+          </a:stretch>
+        </p:blipFill>
+        <p:spPr>
+          <a:xfrm>
+            <a:off x="2424850" y="2097088"/>
+            <a:ext cx="7339123" cy="3497667"/>
+          </a:xfrm>
+          <a:prstGeom prst="rect">
+            <a:avLst/>
+          </a:prstGeom>
+        </p:spPr>
+      </p:pic>
+    </p:spTree>
+    <p:extLst>
+      <p:ext uri="{BB962C8B-B14F-4D97-AF65-F5344CB8AC3E}">
+        <p14:creationId xmlns:p14="http://schemas.microsoft.com/office/powerpoint/2010/main" val="677903732"/>
+      </p:ext>
+    </p:extLst>
+  </p:cSld>
+  <p:clrMapOvr>
+    <a:masterClrMapping/>
+  </p:clrMapOvr>
+</p:sld>
+</file>
+
+<file path=ppt/slides/slide11.xml><?xml version="1.0" encoding="utf-8"?>
+<p:sld xmlns:a="http://schemas.openxmlformats.org/drawingml/2006/main" xmlns:r="http://schemas.openxmlformats.org/officeDocument/2006/relationships" xmlns:p="http://schemas.openxmlformats.org/presentationml/2006/main">
+  <p:cSld>
+    <p:spTree>
+      <p:nvGrpSpPr>
+        <p:cNvPr id="1" name=""/>
+        <p:cNvGrpSpPr/>
+        <p:nvPr/>
+      </p:nvGrpSpPr>
+      <p:grpSpPr>
+        <a:xfrm>
+          <a:off x="0" y="0"/>
+          <a:ext cx="0" cy="0"/>
+          <a:chOff x="0" y="0"/>
+          <a:chExt cx="0" cy="0"/>
+        </a:xfrm>
+      </p:grpSpPr>
+      <p:sp>
+        <p:nvSpPr>
+          <p:cNvPr id="2" name="Title 1">
+            <a:extLst>
+              <a:ext uri="{FF2B5EF4-FFF2-40B4-BE49-F238E27FC236}">
+                <a16:creationId xmlns:a16="http://schemas.microsoft.com/office/drawing/2014/main" id="{DA43E100-FBD7-45D9-A4FD-09EA6B2C9B38}"/>
+              </a:ext>
+            </a:extLst>
+          </p:cNvPr>
+          <p:cNvSpPr>
+            <a:spLocks noGrp="1"/>
+          </p:cNvSpPr>
+          <p:nvPr>
+            <p:ph type="title"/>
+          </p:nvPr>
+        </p:nvSpPr>
+        <p:spPr/>
+        <p:txBody>
+          <a:bodyPr/>
+          <a:lstStyle/>
+          <a:p>
+            <a:r>
+              <a:rPr lang="en-US" dirty="0"/>
+              <a:t>Application</a:t>
+            </a:r>
+          </a:p>
+        </p:txBody>
+      </p:sp>
+      <p:pic>
+        <p:nvPicPr>
+          <p:cNvPr id="4" name="Content Placeholder 3">
+            <a:extLst>
+              <a:ext uri="{FF2B5EF4-FFF2-40B4-BE49-F238E27FC236}">
+                <a16:creationId xmlns:a16="http://schemas.microsoft.com/office/drawing/2014/main" id="{FF66DA7E-D537-4DC2-920D-9528CF4398C5}"/>
+              </a:ext>
+            </a:extLst>
+          </p:cNvPr>
+          <p:cNvPicPr>
+            <a:picLocks noGrp="1" noChangeAspect="1"/>
+          </p:cNvPicPr>
+          <p:nvPr>
+            <p:ph idx="1"/>
+          </p:nvPr>
+        </p:nvPicPr>
+        <p:blipFill>
+          <a:blip r:embed="rId2"/>
+          <a:stretch>
+            <a:fillRect/>
+          </a:stretch>
+        </p:blipFill>
+        <p:spPr>
+          <a:xfrm>
+            <a:off x="678426" y="1740309"/>
+            <a:ext cx="4571999" cy="4689987"/>
+          </a:xfrm>
+          <a:prstGeom prst="rect">
+            <a:avLst/>
+          </a:prstGeom>
+        </p:spPr>
+      </p:pic>
+      <p:pic>
+        <p:nvPicPr>
+          <p:cNvPr id="5" name="Picture 4">
+            <a:extLst>
+              <a:ext uri="{FF2B5EF4-FFF2-40B4-BE49-F238E27FC236}">
+                <a16:creationId xmlns:a16="http://schemas.microsoft.com/office/drawing/2014/main" id="{3FEEA2F3-1E55-404A-947E-9B32B113401E}"/>
+              </a:ext>
+            </a:extLst>
+          </p:cNvPr>
+          <p:cNvPicPr>
+            <a:picLocks noChangeAspect="1"/>
+          </p:cNvPicPr>
+          <p:nvPr/>
+        </p:nvPicPr>
+        <p:blipFill>
+          <a:blip r:embed="rId3"/>
+          <a:stretch>
+            <a:fillRect/>
+          </a:stretch>
+        </p:blipFill>
+        <p:spPr>
+          <a:xfrm>
+            <a:off x="6270368" y="1162971"/>
+            <a:ext cx="5019675" cy="5267325"/>
+          </a:xfrm>
+          <a:prstGeom prst="rect">
+            <a:avLst/>
+          </a:prstGeom>
+        </p:spPr>
+      </p:pic>
+    </p:spTree>
+    <p:extLst>
+      <p:ext uri="{BB962C8B-B14F-4D97-AF65-F5344CB8AC3E}">
+        <p14:creationId xmlns:p14="http://schemas.microsoft.com/office/powerpoint/2010/main" val="1132521138"/>
+      </p:ext>
+    </p:extLst>
+  </p:cSld>
+  <p:clrMapOvr>
+    <a:masterClrMapping/>
+  </p:clrMapOvr>
+</p:sld>
+</file>
+
 <file path=ppt/slides/slide2.xml><?xml version="1.0" encoding="utf-8"?>
 <p:sld xmlns:a="http://schemas.openxmlformats.org/drawingml/2006/main" xmlns:r="http://schemas.openxmlformats.org/officeDocument/2006/relationships" xmlns:p="http://schemas.openxmlformats.org/presentationml/2006/main">
   <p:cSld>
@@ -12721,15 +12934,7 @@
           <a:p>
             <a:r>
               <a:rPr lang="en-US" dirty="0"/>
-              <a:t>Slack pushes notifications to team members when updates are entered and allows for tracking of updates on </a:t>
-            </a:r>
-            <a:r>
-              <a:rPr lang="en-US" dirty="0" err="1"/>
-              <a:t>GetHub</a:t>
-            </a:r>
-            <a:r>
-              <a:rPr lang="en-US" dirty="0"/>
-              <a:t>.</a:t>
+              <a:t>Slack pushes notifications to team members when updates are entered and allows for tracking of updates on GitHub.</a:t>
             </a:r>
           </a:p>
         </p:txBody>
@@ -13110,6 +13315,126 @@
     <p:extLst>
       <p:ext uri="{BB962C8B-B14F-4D97-AF65-F5344CB8AC3E}">
         <p14:creationId xmlns:p14="http://schemas.microsoft.com/office/powerpoint/2010/main" val="2721784184"/>
+      </p:ext>
+    </p:extLst>
+  </p:cSld>
+  <p:clrMapOvr>
+    <a:masterClrMapping/>
+  </p:clrMapOvr>
+</p:sld>
+</file>
+
+<file path=ppt/slides/slide9.xml><?xml version="1.0" encoding="utf-8"?>
+<p:sld xmlns:a="http://schemas.openxmlformats.org/drawingml/2006/main" xmlns:r="http://schemas.openxmlformats.org/officeDocument/2006/relationships" xmlns:p="http://schemas.openxmlformats.org/presentationml/2006/main">
+  <p:cSld>
+    <p:spTree>
+      <p:nvGrpSpPr>
+        <p:cNvPr id="1" name=""/>
+        <p:cNvGrpSpPr/>
+        <p:nvPr/>
+      </p:nvGrpSpPr>
+      <p:grpSpPr>
+        <a:xfrm>
+          <a:off x="0" y="0"/>
+          <a:ext cx="0" cy="0"/>
+          <a:chOff x="0" y="0"/>
+          <a:chExt cx="0" cy="0"/>
+        </a:xfrm>
+      </p:grpSpPr>
+      <p:sp>
+        <p:nvSpPr>
+          <p:cNvPr id="2" name="Title 1">
+            <a:extLst>
+              <a:ext uri="{FF2B5EF4-FFF2-40B4-BE49-F238E27FC236}">
+                <a16:creationId xmlns:a16="http://schemas.microsoft.com/office/drawing/2014/main" id="{71D10948-FB5C-4769-8D34-3373A5A63B8C}"/>
+              </a:ext>
+            </a:extLst>
+          </p:cNvPr>
+          <p:cNvSpPr>
+            <a:spLocks noGrp="1"/>
+          </p:cNvSpPr>
+          <p:nvPr>
+            <p:ph type="title"/>
+          </p:nvPr>
+        </p:nvSpPr>
+        <p:spPr/>
+        <p:txBody>
+          <a:bodyPr/>
+          <a:lstStyle/>
+          <a:p>
+            <a:r>
+              <a:rPr lang="en-US" dirty="0"/>
+              <a:t>Code</a:t>
+            </a:r>
+          </a:p>
+        </p:txBody>
+      </p:sp>
+      <p:pic>
+        <p:nvPicPr>
+          <p:cNvPr id="4" name="Content Placeholder 3">
+            <a:extLst>
+              <a:ext uri="{FF2B5EF4-FFF2-40B4-BE49-F238E27FC236}">
+                <a16:creationId xmlns:a16="http://schemas.microsoft.com/office/drawing/2014/main" id="{1743AD73-27D3-4CC3-A26F-B244FF5BA8E2}"/>
+              </a:ext>
+            </a:extLst>
+          </p:cNvPr>
+          <p:cNvPicPr>
+            <a:picLocks noGrp="1" noChangeAspect="1"/>
+          </p:cNvPicPr>
+          <p:nvPr>
+            <p:ph idx="1"/>
+          </p:nvPr>
+        </p:nvPicPr>
+        <p:blipFill>
+          <a:blip r:embed="rId2"/>
+          <a:stretch>
+            <a:fillRect/>
+          </a:stretch>
+        </p:blipFill>
+        <p:spPr>
+          <a:xfrm>
+            <a:off x="411909" y="1681316"/>
+            <a:ext cx="5178939" cy="4837471"/>
+          </a:xfrm>
+          <a:prstGeom prst="rect">
+            <a:avLst/>
+          </a:prstGeom>
+        </p:spPr>
+      </p:pic>
+      <p:pic>
+        <p:nvPicPr>
+          <p:cNvPr id="5" name="Picture 4">
+            <a:extLst>
+              <a:ext uri="{FF2B5EF4-FFF2-40B4-BE49-F238E27FC236}">
+                <a16:creationId xmlns:a16="http://schemas.microsoft.com/office/drawing/2014/main" id="{CAAAA02C-60E1-446D-AD0E-ED74726B350B}"/>
+              </a:ext>
+            </a:extLst>
+          </p:cNvPr>
+          <p:cNvPicPr>
+            <a:picLocks noChangeAspect="1"/>
+          </p:cNvPicPr>
+          <p:nvPr/>
+        </p:nvPicPr>
+        <p:blipFill>
+          <a:blip r:embed="rId3"/>
+          <a:stretch>
+            <a:fillRect/>
+          </a:stretch>
+        </p:blipFill>
+        <p:spPr>
+          <a:xfrm>
+            <a:off x="6210412" y="811161"/>
+            <a:ext cx="5352324" cy="5707626"/>
+          </a:xfrm>
+          <a:prstGeom prst="rect">
+            <a:avLst/>
+          </a:prstGeom>
+        </p:spPr>
+      </p:pic>
+    </p:spTree>
+    <p:extLst>
+      <p:ext uri="{BB962C8B-B14F-4D97-AF65-F5344CB8AC3E}">
+        <p14:creationId xmlns:p14="http://schemas.microsoft.com/office/powerpoint/2010/main" val="1611930595"/>
       </p:ext>
     </p:extLst>
   </p:cSld>

</xml_diff>